<commit_message>
Add github entry for none meizu readers in presentations
</commit_message>
<xml_diff>
--- a/presentations/Android Gradle 从入门到GG 0.pptx
+++ b/presentations/Android Gradle 从入门到GG 0.pptx
@@ -233,7 +233,7 @@
           <a:p>
             <a:fld id="{0F550209-2865-4062-9A66-2B6A574442D5}" type="datetimeFigureOut">
               <a:rPr lang="zh-CN" altLang="en-US" smtClean="0"/>
-              <a:t>2016/4/14</a:t>
+              <a:t>2016/4/15</a:t>
             </a:fld>
             <a:endParaRPr lang="zh-CN" altLang="en-US"/>
           </a:p>
@@ -701,7 +701,7 @@
           <a:p>
             <a:fld id="{99E682FB-6D4D-4FEA-8B74-84865064F1D0}" type="datetime2">
               <a:rPr lang="zh-CN" altLang="en-US" smtClean="0"/>
-              <a:t>2016年4月14日</a:t>
+              <a:t>2016年4月15日</a:t>
             </a:fld>
             <a:endParaRPr lang="en-US" altLang="zh-CN" dirty="0"/>
           </a:p>
@@ -1259,7 +1259,7 @@
           <a:p>
             <a:fld id="{99E682FB-6D4D-4FEA-8B74-84865064F1D0}" type="datetime2">
               <a:rPr lang="zh-CN" altLang="en-US" smtClean="0"/>
-              <a:t>2016年4月14日</a:t>
+              <a:t>2016年4月15日</a:t>
             </a:fld>
             <a:endParaRPr lang="en-US" altLang="zh-CN" dirty="0"/>
           </a:p>
@@ -1491,7 +1491,7 @@
           <a:p>
             <a:fld id="{530820CF-B880-4189-942D-D702A7CBA730}" type="datetimeFigureOut">
               <a:rPr lang="zh-CN" altLang="en-US" smtClean="0"/>
-              <a:t>2016/4/14</a:t>
+              <a:t>2016/4/15</a:t>
             </a:fld>
             <a:endParaRPr lang="zh-CN" altLang="en-US"/>
           </a:p>
@@ -5593,18 +5593,12 @@
             <a:endParaRPr lang="en-US" altLang="zh-CN" dirty="0"/>
           </a:p>
           <a:p>
-            <a:endParaRPr lang="en-US" altLang="zh-CN" dirty="0"/>
-          </a:p>
-          <a:p>
             <a:r>
               <a:rPr lang="en-US" altLang="zh-CN" sz="2800" dirty="0">
                 <a:hlinkClick r:id="rId2"/>
               </a:rPr>
               <a:t>http://git.ipd.meizu.com/AnR/android-gradle-samples</a:t>
             </a:r>
-            <a:endParaRPr lang="en-US" altLang="zh-CN" sz="2800" dirty="0"/>
-          </a:p>
-          <a:p>
             <a:endParaRPr lang="en-US" altLang="zh-CN" dirty="0"/>
           </a:p>
           <a:p>
@@ -5620,6 +5614,37 @@
               <a:rPr lang="zh-CN" altLang="en-US" dirty="0"/>
               <a:t>给我</a:t>
             </a:r>
+            <a:endParaRPr lang="en-US" altLang="zh-CN" dirty="0"/>
+          </a:p>
+          <a:p>
+            <a:endParaRPr lang="en-US" altLang="zh-CN" dirty="0"/>
+          </a:p>
+          <a:p>
+            <a:r>
+              <a:rPr lang="en-US" altLang="zh-CN" sz="2400" dirty="0"/>
+              <a:t>[Github</a:t>
+            </a:r>
+            <a:r>
+              <a:rPr lang="zh-CN" altLang="en-US" sz="2400" dirty="0"/>
+              <a:t>用户移步</a:t>
+            </a:r>
+            <a:r>
+              <a:rPr lang="en-US" altLang="zh-CN" sz="2400" dirty="0"/>
+              <a:t>] </a:t>
+            </a:r>
+            <a:r>
+              <a:rPr lang="en-US" altLang="zh-CN" sz="2000" dirty="0">
+                <a:hlinkClick r:id="rId3"/>
+              </a:rPr>
+              <a:t>https://github.com/Jween/android-gradle-samples</a:t>
+            </a:r>
+            <a:endParaRPr lang="en-US" altLang="zh-CN" sz="2000" dirty="0"/>
+          </a:p>
+          <a:p>
+            <a:endParaRPr lang="en-US" altLang="zh-CN" sz="2400" dirty="0"/>
+          </a:p>
+          <a:p>
+            <a:endParaRPr lang="zh-CN" altLang="en-US" sz="2400" dirty="0"/>
           </a:p>
         </p:txBody>
       </p:sp>
@@ -9779,7 +9804,7 @@
           <a:p>
             <a:fld id="{99E682FB-6D4D-4FEA-8B74-84865064F1D0}" type="datetime2">
               <a:rPr lang="zh-CN" altLang="en-US" smtClean="0"/>
-              <a:t>2016年4月14日</a:t>
+              <a:t>2016年4月15日</a:t>
             </a:fld>
             <a:endParaRPr lang="en-US" altLang="zh-CN" dirty="0"/>
           </a:p>

</xml_diff>

<commit_message>
Presentation: Update master page, fix the wrong margins
</commit_message>
<xml_diff>
--- a/presentations/Android Gradle 从入门到GG 0.pptx
+++ b/presentations/Android Gradle 从入门到GG 0.pptx
@@ -679,7 +679,7 @@
       </p:sp>
       <p:sp>
         <p:nvSpPr>
-          <p:cNvPr id="16" name="文本框 6"/>
+          <p:cNvPr id="8" name="文本框 6"/>
           <p:cNvSpPr txBox="1"/>
           <p:nvPr userDrawn="1"/>
         </p:nvSpPr>
@@ -699,8 +699,10 @@
           </a:bodyPr>
           <a:lstStyle/>
           <a:p>
+            <a:pPr algn="ctr"/>
             <a:fld id="{99E682FB-6D4D-4FEA-8B74-84865064F1D0}" type="datetime2">
               <a:rPr lang="zh-CN" altLang="en-US" smtClean="0"/>
+              <a:pPr algn="ctr"/>
               <a:t>2016年4月15日</a:t>
             </a:fld>
             <a:endParaRPr lang="en-US" altLang="zh-CN" dirty="0"/>
@@ -709,14 +711,14 @@
       </p:sp>
       <p:sp>
         <p:nvSpPr>
-          <p:cNvPr id="17" name="TextBox 11"/>
+          <p:cNvPr id="9" name="TextBox 11"/>
           <p:cNvSpPr txBox="1"/>
           <p:nvPr userDrawn="1"/>
         </p:nvSpPr>
         <p:spPr>
           <a:xfrm>
-            <a:off x="7164288" y="5939988"/>
-            <a:ext cx="1696298" cy="369332"/>
+            <a:off x="7684291" y="5498648"/>
+            <a:ext cx="720080" cy="369332"/>
           </a:xfrm>
           <a:prstGeom prst="rect">
             <a:avLst/>
@@ -729,6 +731,38 @@
           </a:bodyPr>
           <a:lstStyle/>
           <a:p>
+            <a:pPr algn="ctr"/>
+            <a:r>
+              <a:rPr lang="zh-CN" altLang="en-US" dirty="0"/>
+              <a:t>刘俊</a:t>
+            </a:r>
+            <a:endParaRPr lang="en-US" altLang="zh-CN" dirty="0"/>
+          </a:p>
+        </p:txBody>
+      </p:sp>
+      <p:sp>
+        <p:nvSpPr>
+          <p:cNvPr id="10" name="TextBox 11"/>
+          <p:cNvSpPr txBox="1"/>
+          <p:nvPr userDrawn="1"/>
+        </p:nvSpPr>
+        <p:spPr>
+          <a:xfrm>
+            <a:off x="7196182" y="5867980"/>
+            <a:ext cx="1696298" cy="369332"/>
+          </a:xfrm>
+          <a:prstGeom prst="rect">
+            <a:avLst/>
+          </a:prstGeom>
+          <a:noFill/>
+        </p:spPr>
+        <p:txBody>
+          <a:bodyPr wrap="square" rtlCol="0">
+            <a:spAutoFit/>
+          </a:bodyPr>
+          <a:lstStyle/>
+          <a:p>
+            <a:pPr algn="ctr"/>
             <a:r>
               <a:rPr lang="en-US" altLang="zh-CN" dirty="0"/>
               <a:t>IPD</a:t>
@@ -1237,7 +1271,7 @@
       </p:sp>
       <p:sp>
         <p:nvSpPr>
-          <p:cNvPr id="7" name="文本框 6"/>
+          <p:cNvPr id="6" name="文本框 6"/>
           <p:cNvSpPr txBox="1"/>
           <p:nvPr userDrawn="1"/>
         </p:nvSpPr>
@@ -1257,8 +1291,10 @@
           </a:bodyPr>
           <a:lstStyle/>
           <a:p>
+            <a:pPr algn="ctr"/>
             <a:fld id="{99E682FB-6D4D-4FEA-8B74-84865064F1D0}" type="datetime2">
               <a:rPr lang="zh-CN" altLang="en-US" smtClean="0"/>
+              <a:pPr algn="ctr"/>
               <a:t>2016年4月15日</a:t>
             </a:fld>
             <a:endParaRPr lang="en-US" altLang="zh-CN" dirty="0"/>
@@ -1267,14 +1303,14 @@
       </p:sp>
       <p:sp>
         <p:nvSpPr>
-          <p:cNvPr id="8" name="TextBox 11"/>
+          <p:cNvPr id="9" name="TextBox 11"/>
           <p:cNvSpPr txBox="1"/>
           <p:nvPr userDrawn="1"/>
         </p:nvSpPr>
         <p:spPr>
           <a:xfrm>
-            <a:off x="7164288" y="5939988"/>
-            <a:ext cx="1696298" cy="369332"/>
+            <a:off x="7684291" y="5498648"/>
+            <a:ext cx="720080" cy="369332"/>
           </a:xfrm>
           <a:prstGeom prst="rect">
             <a:avLst/>
@@ -1287,6 +1323,38 @@
           </a:bodyPr>
           <a:lstStyle/>
           <a:p>
+            <a:pPr algn="ctr"/>
+            <a:r>
+              <a:rPr lang="zh-CN" altLang="en-US" dirty="0"/>
+              <a:t>刘俊</a:t>
+            </a:r>
+            <a:endParaRPr lang="en-US" altLang="zh-CN" dirty="0"/>
+          </a:p>
+        </p:txBody>
+      </p:sp>
+      <p:sp>
+        <p:nvSpPr>
+          <p:cNvPr id="10" name="TextBox 11"/>
+          <p:cNvSpPr txBox="1"/>
+          <p:nvPr userDrawn="1"/>
+        </p:nvSpPr>
+        <p:spPr>
+          <a:xfrm>
+            <a:off x="7196182" y="5867980"/>
+            <a:ext cx="1696298" cy="369332"/>
+          </a:xfrm>
+          <a:prstGeom prst="rect">
+            <a:avLst/>
+          </a:prstGeom>
+          <a:noFill/>
+        </p:spPr>
+        <p:txBody>
+          <a:bodyPr wrap="square" rtlCol="0">
+            <a:spAutoFit/>
+          </a:bodyPr>
+          <a:lstStyle/>
+          <a:p>
+            <a:pPr algn="ctr"/>
             <a:r>
               <a:rPr lang="en-US" altLang="zh-CN" dirty="0"/>
               <a:t>IPD</a:t>
@@ -1397,30 +1465,104 @@
           </a:p>
         </p:txBody>
       </p:sp>
-      <p:pic>
-        <p:nvPicPr>
-          <p:cNvPr id="2" name="图片 1"/>
-          <p:cNvPicPr>
-            <a:picLocks noChangeAspect="1"/>
-          </p:cNvPicPr>
+      <p:sp>
+        <p:nvSpPr>
+          <p:cNvPr id="4" name="文本框 6"/>
+          <p:cNvSpPr txBox="1"/>
           <p:nvPr userDrawn="1"/>
-        </p:nvPicPr>
-        <p:blipFill>
-          <a:blip r:embed="rId2"/>
-          <a:stretch>
-            <a:fillRect/>
-          </a:stretch>
-        </p:blipFill>
+        </p:nvSpPr>
         <p:spPr>
           <a:xfrm>
-            <a:off x="3334404" y="2932133"/>
-            <a:ext cx="2475191" cy="993734"/>
+            <a:off x="7196182" y="6237312"/>
+            <a:ext cx="1696298" cy="369332"/>
           </a:xfrm>
           <a:prstGeom prst="rect">
             <a:avLst/>
           </a:prstGeom>
-        </p:spPr>
-      </p:pic>
+          <a:noFill/>
+        </p:spPr>
+        <p:txBody>
+          <a:bodyPr wrap="square" rtlCol="0">
+            <a:spAutoFit/>
+          </a:bodyPr>
+          <a:lstStyle/>
+          <a:p>
+            <a:pPr algn="ctr"/>
+            <a:fld id="{99E682FB-6D4D-4FEA-8B74-84865064F1D0}" type="datetime2">
+              <a:rPr lang="zh-CN" altLang="en-US" smtClean="0"/>
+              <a:pPr algn="ctr"/>
+              <a:t>2016年4月15日</a:t>
+            </a:fld>
+            <a:endParaRPr lang="en-US" altLang="zh-CN" dirty="0"/>
+          </a:p>
+        </p:txBody>
+      </p:sp>
+      <p:sp>
+        <p:nvSpPr>
+          <p:cNvPr id="5" name="TextBox 11"/>
+          <p:cNvSpPr txBox="1"/>
+          <p:nvPr userDrawn="1"/>
+        </p:nvSpPr>
+        <p:spPr>
+          <a:xfrm>
+            <a:off x="7684291" y="5498648"/>
+            <a:ext cx="720080" cy="369332"/>
+          </a:xfrm>
+          <a:prstGeom prst="rect">
+            <a:avLst/>
+          </a:prstGeom>
+          <a:noFill/>
+        </p:spPr>
+        <p:txBody>
+          <a:bodyPr wrap="square" rtlCol="0">
+            <a:spAutoFit/>
+          </a:bodyPr>
+          <a:lstStyle/>
+          <a:p>
+            <a:pPr algn="ctr"/>
+            <a:r>
+              <a:rPr lang="zh-CN" altLang="en-US" dirty="0"/>
+              <a:t>刘俊</a:t>
+            </a:r>
+            <a:endParaRPr lang="en-US" altLang="zh-CN" dirty="0"/>
+          </a:p>
+        </p:txBody>
+      </p:sp>
+      <p:sp>
+        <p:nvSpPr>
+          <p:cNvPr id="6" name="TextBox 11"/>
+          <p:cNvSpPr txBox="1"/>
+          <p:nvPr userDrawn="1"/>
+        </p:nvSpPr>
+        <p:spPr>
+          <a:xfrm>
+            <a:off x="7196182" y="5867980"/>
+            <a:ext cx="1696298" cy="369332"/>
+          </a:xfrm>
+          <a:prstGeom prst="rect">
+            <a:avLst/>
+          </a:prstGeom>
+          <a:noFill/>
+        </p:spPr>
+        <p:txBody>
+          <a:bodyPr wrap="square" rtlCol="0">
+            <a:spAutoFit/>
+          </a:bodyPr>
+          <a:lstStyle/>
+          <a:p>
+            <a:pPr algn="ctr"/>
+            <a:r>
+              <a:rPr lang="en-US" altLang="zh-CN" dirty="0"/>
+              <a:t>IPD</a:t>
+            </a:r>
+            <a:r>
+              <a:rPr lang="zh-CN" altLang="en-US" dirty="0"/>
+              <a:t>创新产品部</a:t>
+            </a:r>
+            <a:endParaRPr lang="en-US" altLang="zh-CN" dirty="0"/>
+          </a:p>
+        </p:txBody>
+      </p:sp>
     </p:spTree>
     <p:extLst>
       <p:ext uri="{BB962C8B-B14F-4D97-AF65-F5344CB8AC3E}">
@@ -2069,18 +2211,18 @@
           <a:p>
             <a:pPr algn="l"/>
             <a:r>
-              <a:rPr lang="en-US" altLang="zh-CN" dirty="0"/>
+              <a:rPr lang="en-US" altLang="zh-CN"/>
               <a:t>Android Gradle</a:t>
             </a:r>
           </a:p>
           <a:p>
             <a:pPr algn="l"/>
             <a:r>
-              <a:rPr lang="zh-CN" altLang="en-US" dirty="0"/>
+              <a:rPr lang="zh-CN" altLang="en-US"/>
               <a:t>从入门到</a:t>
             </a:r>
             <a:r>
-              <a:rPr lang="en-US" altLang="zh-CN" dirty="0"/>
+              <a:rPr lang="en-US" altLang="zh-CN"/>
               <a:t>GG</a:t>
             </a:r>
             <a:endParaRPr lang="zh-CN" altLang="en-US" dirty="0"/>
@@ -8036,7 +8178,7 @@
         </p:nvSpPr>
         <p:spPr>
           <a:xfrm>
-            <a:off x="467544" y="4221088"/>
+            <a:off x="467544" y="4293096"/>
             <a:ext cx="8280920" cy="1872208"/>
           </a:xfrm>
           <a:prstGeom prst="rect">
@@ -9802,8 +9944,10 @@
           </a:bodyPr>
           <a:lstStyle/>
           <a:p>
+            <a:pPr algn="ctr"/>
             <a:fld id="{99E682FB-6D4D-4FEA-8B74-84865064F1D0}" type="datetime2">
               <a:rPr lang="zh-CN" altLang="en-US" smtClean="0"/>
+              <a:pPr algn="ctr"/>
               <a:t>2016年4月15日</a:t>
             </a:fld>
             <a:endParaRPr lang="en-US" altLang="zh-CN" dirty="0"/>
@@ -9818,8 +9962,8 @@
         </p:nvSpPr>
         <p:spPr>
           <a:xfrm>
-            <a:off x="7164288" y="5939988"/>
-            <a:ext cx="1696298" cy="369332"/>
+            <a:off x="7684291" y="5498648"/>
+            <a:ext cx="720080" cy="369332"/>
           </a:xfrm>
           <a:prstGeom prst="rect">
             <a:avLst/>
@@ -9832,6 +9976,87 @@
           </a:bodyPr>
           <a:lstStyle/>
           <a:p>
+            <a:pPr algn="ctr"/>
+            <a:r>
+              <a:rPr lang="zh-CN" altLang="en-US" dirty="0"/>
+              <a:t>刘俊</a:t>
+            </a:r>
+            <a:endParaRPr lang="en-US" altLang="zh-CN" dirty="0"/>
+          </a:p>
+        </p:txBody>
+      </p:sp>
+      <p:sp>
+        <p:nvSpPr>
+          <p:cNvPr id="7" name="矩形 6"/>
+          <p:cNvSpPr/>
+          <p:nvPr/>
+        </p:nvSpPr>
+        <p:spPr>
+          <a:xfrm>
+            <a:off x="1907704" y="4581128"/>
+            <a:ext cx="5112568" cy="1200329"/>
+          </a:xfrm>
+          <a:prstGeom prst="rect">
+            <a:avLst/>
+          </a:prstGeom>
+        </p:spPr>
+        <p:txBody>
+          <a:bodyPr wrap="square">
+            <a:spAutoFit/>
+          </a:bodyPr>
+          <a:lstStyle/>
+          <a:p>
+            <a:pPr algn="ctr"/>
+            <a:r>
+              <a:rPr kumimoji="1" lang="zh-CN" altLang="en-US" sz="3600" b="1" dirty="0">
+                <a:latin typeface="Arial" charset="0"/>
+                <a:ea typeface="黑体" pitchFamily="2" charset="-122"/>
+              </a:rPr>
+              <a:t>这将是一个系列课程</a:t>
+            </a:r>
+            <a:r>
+              <a:rPr kumimoji="1" lang="en-US" altLang="zh-CN" sz="3600" b="1" dirty="0">
+                <a:latin typeface="Arial" charset="0"/>
+                <a:ea typeface="黑体" pitchFamily="2" charset="-122"/>
+              </a:rPr>
+              <a:t>, </a:t>
+            </a:r>
+          </a:p>
+          <a:p>
+            <a:pPr algn="ctr"/>
+            <a:r>
+              <a:rPr kumimoji="1" lang="zh-CN" altLang="en-US" sz="3600" b="1" dirty="0">
+                <a:latin typeface="Arial" charset="0"/>
+                <a:ea typeface="黑体" pitchFamily="2" charset="-122"/>
+              </a:rPr>
+              <a:t>每周一节课</a:t>
+            </a:r>
+          </a:p>
+        </p:txBody>
+      </p:sp>
+      <p:sp>
+        <p:nvSpPr>
+          <p:cNvPr id="8" name="TextBox 11"/>
+          <p:cNvSpPr txBox="1"/>
+          <p:nvPr/>
+        </p:nvSpPr>
+        <p:spPr>
+          <a:xfrm>
+            <a:off x="7196182" y="5867980"/>
+            <a:ext cx="1696298" cy="369332"/>
+          </a:xfrm>
+          <a:prstGeom prst="rect">
+            <a:avLst/>
+          </a:prstGeom>
+          <a:noFill/>
+        </p:spPr>
+        <p:txBody>
+          <a:bodyPr wrap="square" rtlCol="0">
+            <a:spAutoFit/>
+          </a:bodyPr>
+          <a:lstStyle/>
+          <a:p>
+            <a:pPr algn="ctr"/>
             <a:r>
               <a:rPr lang="en-US" altLang="zh-CN" dirty="0"/>
               <a:t>IPD</a:t>

</xml_diff>